<commit_message>
Upgraded to Restify 6.2.0 & botbuilder 3.11.0
</commit_message>
<xml_diff>
--- a/Slides/MissionMars/4 - Knowledge base bots.pptx
+++ b/Slides/MissionMars/4 - Knowledge base bots.pptx
@@ -216,6 +216,10 @@
 </p:presentation>
 </file>
 
+<file path=ppt/revisionInfo.xml><?xml version="1.0" encoding="utf-8"?>
+<p1510:revInfo xmlns:a="http://schemas.openxmlformats.org/drawingml/2006/main" xmlns:r="http://schemas.openxmlformats.org/officeDocument/2006/relationships" xmlns:p1510="http://schemas.microsoft.com/office/powerpoint/2015/10/main"/>
+</file>
+
 <file path=ppt/handoutMasters/handoutMaster1.xml><?xml version="1.0" encoding="utf-8"?>
 <p:handoutMaster xmlns:a="http://schemas.openxmlformats.org/drawingml/2006/main" xmlns:r="http://schemas.openxmlformats.org/officeDocument/2006/relationships" xmlns:p="http://schemas.openxmlformats.org/presentationml/2006/main">
   <p:cSld>
@@ -323,7 +327,7 @@
               <a:pPr>
                 <a:defRPr/>
               </a:pPr>
-              <a:t>6/19/2017</a:t>
+              <a:t>9/23/2017</a:t>
             </a:fld>
             <a:endParaRPr lang="en-US"/>
           </a:p>
@@ -533,7 +537,7 @@
               <a:pPr>
                 <a:defRPr/>
               </a:pPr>
-              <a:t>6/19/2017</a:t>
+              <a:t>9/23/2017</a:t>
             </a:fld>
             <a:endParaRPr lang="en-US"/>
           </a:p>
@@ -997,7 +1001,7 @@
           <a:p>
             <a:fld id="{38EEC551-8CDA-4EB6-89BB-2A86C9F091C8}" type="datetime8">
               <a:rPr lang="en-US" smtClean="0"/>
-              <a:t>6/19/2017 9:18 AM</a:t>
+              <a:t>9/23/2017 9:28 PM</a:t>
             </a:fld>
             <a:endParaRPr lang="en-US" dirty="0"/>
           </a:p>
@@ -1186,7 +1190,7 @@
           <a:p>
             <a:fld id="{38EEC551-8CDA-4EB6-89BB-2A86C9F091C8}" type="datetime8">
               <a:rPr lang="en-US" smtClean="0"/>
-              <a:t>6/19/2017 9:18 AM</a:t>
+              <a:t>9/23/2017 9:28 PM</a:t>
             </a:fld>
             <a:endParaRPr lang="en-US" dirty="0"/>
           </a:p>
@@ -1375,7 +1379,7 @@
           <a:p>
             <a:fld id="{38EEC551-8CDA-4EB6-89BB-2A86C9F091C8}" type="datetime8">
               <a:rPr lang="en-US" smtClean="0"/>
-              <a:t>6/19/2017 9:18 AM</a:t>
+              <a:t>9/23/2017 9:28 PM</a:t>
             </a:fld>
             <a:endParaRPr lang="en-US" dirty="0"/>
           </a:p>
@@ -2597,7 +2601,7 @@
               <a:pPr>
                 <a:defRPr/>
               </a:pPr>
-              <a:t>6/19/2017</a:t>
+              <a:t>9/23/2017</a:t>
             </a:fld>
             <a:endParaRPr lang="en-US"/>
           </a:p>
@@ -2821,7 +2825,7 @@
               <a:pPr>
                 <a:defRPr/>
               </a:pPr>
-              <a:t>6/19/2017</a:t>
+              <a:t>9/23/2017</a:t>
             </a:fld>
             <a:endParaRPr lang="en-US"/>
           </a:p>
@@ -15308,7 +15312,7 @@
               <a:pPr>
                 <a:defRPr/>
               </a:pPr>
-              <a:t>6/19/2017</a:t>
+              <a:t>9/23/2017</a:t>
             </a:fld>
             <a:endParaRPr lang="en-US"/>
           </a:p>
@@ -17212,7 +17216,7 @@
               <a:pPr>
                 <a:defRPr/>
               </a:pPr>
-              <a:t>6/19/2017</a:t>
+              <a:t>9/23/2017</a:t>
             </a:fld>
             <a:endParaRPr lang="en-US"/>
           </a:p>
@@ -18973,7 +18977,7 @@
               <a:pPr>
                 <a:defRPr/>
               </a:pPr>
-              <a:t>6/19/2017</a:t>
+              <a:t>9/23/2017</a:t>
             </a:fld>
             <a:endParaRPr lang="en-US"/>
           </a:p>
@@ -20015,7 +20019,7 @@
               <a:pPr>
                 <a:defRPr/>
               </a:pPr>
-              <a:t>6/19/2017</a:t>
+              <a:t>9/23/2017</a:t>
             </a:fld>
             <a:endParaRPr lang="en-US"/>
           </a:p>
@@ -20342,7 +20346,7 @@
               <a:pPr>
                 <a:defRPr/>
               </a:pPr>
-              <a:t>6/19/2017</a:t>
+              <a:t>9/23/2017</a:t>
             </a:fld>
             <a:endParaRPr lang="en-US"/>
           </a:p>
@@ -21530,7 +21534,7 @@
               <a:pPr>
                 <a:defRPr/>
               </a:pPr>
-              <a:t>6/19/2017</a:t>
+              <a:t>9/23/2017</a:t>
             </a:fld>
             <a:endParaRPr lang="en-US"/>
           </a:p>
@@ -22735,7 +22739,7 @@
               <a:pPr>
                 <a:defRPr/>
               </a:pPr>
-              <a:t>6/19/2017</a:t>
+              <a:t>9/23/2017</a:t>
             </a:fld>
             <a:endParaRPr lang="en-US"/>
           </a:p>
@@ -22893,7 +22897,7 @@
               </a14:hiddenLine>
             </a:ext>
             <a:ext uri="{FAA26D3D-D897-4be2-8F04-BA451C77F1D7}">
-              <ma14:placeholderFlag xmlns:ma14="http://schemas.microsoft.com/office/mac/drawingml/2011/main" xmlns="" val="1"/>
+              <ma14:placeholderFlag xmlns="" xmlns:ma14="http://schemas.microsoft.com/office/mac/drawingml/2011/main" val="1"/>
             </a:ext>
           </a:extLst>
         </p:spPr>
@@ -22954,7 +22958,7 @@
               </a14:hiddenLine>
             </a:ext>
             <a:ext uri="{FAA26D3D-D897-4be2-8F04-BA451C77F1D7}">
-              <ma14:placeholderFlag xmlns:ma14="http://schemas.microsoft.com/office/mac/drawingml/2011/main" xmlns="" val="1"/>
+              <ma14:placeholderFlag xmlns="" xmlns:ma14="http://schemas.microsoft.com/office/mac/drawingml/2011/main" val="1"/>
             </a:ext>
           </a:extLst>
         </p:spPr>
@@ -23052,7 +23056,7 @@
               <a:pPr>
                 <a:defRPr/>
               </a:pPr>
-              <a:t>6/19/2017</a:t>
+              <a:t>9/23/2017</a:t>
             </a:fld>
             <a:endParaRPr lang="en-US"/>
           </a:p>
@@ -32216,7 +32220,7 @@
 </file>
 
 <file path=ppt/slides/slide24.xml><?xml version="1.0" encoding="utf-8"?>
-<p:sld xmlns:a="http://schemas.openxmlformats.org/drawingml/2006/main" xmlns:r="http://schemas.openxmlformats.org/officeDocument/2006/relationships" xmlns:p="http://schemas.openxmlformats.org/presentationml/2006/main">
+<p:sld xmlns:a="http://schemas.openxmlformats.org/drawingml/2006/main" xmlns:r="http://schemas.openxmlformats.org/officeDocument/2006/relationships" xmlns:p="http://schemas.openxmlformats.org/presentationml/2006/main" show="0">
   <p:cSld>
     <p:spTree>
       <p:nvGrpSpPr>
@@ -32276,13 +32280,13 @@
   <p:clrMapOvr>
     <a:masterClrMapping/>
   </p:clrMapOvr>
-  <mc:AlternateContent xmlns:mc="http://schemas.openxmlformats.org/markup-compatibility/2006" xmlns:p14="http://schemas.microsoft.com/office/powerpoint/2010/main">
-    <mc:Choice Requires="p14">
+  <mc:AlternateContent xmlns:mc="http://schemas.openxmlformats.org/markup-compatibility/2006">
+    <mc:Choice xmlns:p14="http://schemas.microsoft.com/office/powerpoint/2010/main" Requires="p14">
       <p:transition spd="slow" p14:dur="3400">
         <p14:reveal/>
       </p:transition>
     </mc:Choice>
-    <mc:Fallback xmlns="">
+    <mc:Fallback>
       <p:transition spd="slow">
         <p:fade/>
       </p:transition>
@@ -32526,7 +32530,7 @@
 </file>
 
 <file path=ppt/slides/slide27.xml><?xml version="1.0" encoding="utf-8"?>
-<p:sld xmlns:a="http://schemas.openxmlformats.org/drawingml/2006/main" xmlns:r="http://schemas.openxmlformats.org/officeDocument/2006/relationships" xmlns:p="http://schemas.openxmlformats.org/presentationml/2006/main">
+<p:sld xmlns:a="http://schemas.openxmlformats.org/drawingml/2006/main" xmlns:r="http://schemas.openxmlformats.org/officeDocument/2006/relationships" xmlns:p="http://schemas.openxmlformats.org/presentationml/2006/main" show="0">
   <p:cSld>
     <p:spTree>
       <p:nvGrpSpPr>
@@ -32579,13 +32583,13 @@
   <p:clrMapOvr>
     <a:masterClrMapping/>
   </p:clrMapOvr>
-  <mc:AlternateContent xmlns:mc="http://schemas.openxmlformats.org/markup-compatibility/2006" xmlns:p14="http://schemas.microsoft.com/office/powerpoint/2010/main">
-    <mc:Choice Requires="p14">
+  <mc:AlternateContent xmlns:mc="http://schemas.openxmlformats.org/markup-compatibility/2006">
+    <mc:Choice xmlns:p14="http://schemas.microsoft.com/office/powerpoint/2010/main" Requires="p14">
       <p:transition spd="slow" p14:dur="3400">
         <p14:reveal/>
       </p:transition>
     </mc:Choice>
-    <mc:Fallback xmlns="">
+    <mc:Fallback>
       <p:transition spd="slow">
         <p:fade/>
       </p:transition>
@@ -36285,25 +36289,25 @@
 
 <file path=customXml/item2.xml><?xml version="1.0" encoding="utf-8"?>
 <Control xmlns="http://schemas.microsoft.com/VisualStudio/2011/storyboarding/control">
-  <Id Name="d69996e1-3d61-4686-9b63-f1b855c596ab" Revision="1" Stencil="7276b9ef-3953-4dce-a89b-ed85f20b8b93" StencilVersion="1.0"/>
+  <Id Name="a2191c86-fc50-4add-948c-129f6b5a88d8" Revision="1" Stencil="7276b9ef-3953-4dce-a89b-ed85f20b8b93" StencilVersion="1.0"/>
 </Control>
 </file>
 
 <file path=customXml/item3.xml><?xml version="1.0" encoding="utf-8"?>
 <Control xmlns="http://schemas.microsoft.com/VisualStudio/2011/storyboarding/control">
-  <Id Name="fb22c541-ded0-47fa-8877-83a4c2d16227" Revision="1" Stencil="7276b9ef-3953-4dce-a89b-ed85f20b8b93" StencilVersion="1.0"/>
+  <Id Name="a2191c86-fc50-4add-948c-129f6b5a88d8" Revision="1" Stencil="7276b9ef-3953-4dce-a89b-ed85f20b8b93" StencilVersion="1.0"/>
 </Control>
 </file>
 
 <file path=customXml/item4.xml><?xml version="1.0" encoding="utf-8"?>
 <Control xmlns="http://schemas.microsoft.com/VisualStudio/2011/storyboarding/control">
-  <Id Name="a2191c86-fc50-4add-948c-129f6b5a88d8" Revision="1" Stencil="7276b9ef-3953-4dce-a89b-ed85f20b8b93" StencilVersion="1.0"/>
+  <Id Name="fb22c541-ded0-47fa-8877-83a4c2d16227" Revision="1" Stencil="7276b9ef-3953-4dce-a89b-ed85f20b8b93" StencilVersion="1.0"/>
 </Control>
 </file>
 
 <file path=customXml/item5.xml><?xml version="1.0" encoding="utf-8"?>
 <Control xmlns="http://schemas.microsoft.com/VisualStudio/2011/storyboarding/control">
-  <Id Name="a2191c86-fc50-4add-948c-129f6b5a88d8" Revision="1" Stencil="7276b9ef-3953-4dce-a89b-ed85f20b8b93" StencilVersion="1.0"/>
+  <Id Name="d69996e1-3d61-4686-9b63-f1b855c596ab" Revision="1" Stencil="7276b9ef-3953-4dce-a89b-ed85f20b8b93" StencilVersion="1.0"/>
 </Control>
 </file>
 
@@ -36316,7 +36320,7 @@
 </file>
 
 <file path=customXml/itemProps2.xml><?xml version="1.0" encoding="utf-8"?>
-<ds:datastoreItem xmlns:ds="http://schemas.openxmlformats.org/officeDocument/2006/customXml" ds:itemID="{C0F92A87-A216-45A9-B9C0-0515663D35BF}">
+<ds:datastoreItem xmlns:ds="http://schemas.openxmlformats.org/officeDocument/2006/customXml" ds:itemID="{0B54C583-7BAB-4080-8093-C5F84F5A225A}">
   <ds:schemaRefs>
     <ds:schemaRef ds:uri="http://schemas.microsoft.com/VisualStudio/2011/storyboarding/control"/>
   </ds:schemaRefs>
@@ -36324,6 +36328,14 @@
 </file>
 
 <file path=customXml/itemProps3.xml><?xml version="1.0" encoding="utf-8"?>
+<ds:datastoreItem xmlns:ds="http://schemas.openxmlformats.org/officeDocument/2006/customXml" ds:itemID="{8257D6BC-B71E-4D95-81E4-A1D4A8174168}">
+  <ds:schemaRefs>
+    <ds:schemaRef ds:uri="http://schemas.microsoft.com/VisualStudio/2011/storyboarding/control"/>
+  </ds:schemaRefs>
+</ds:datastoreItem>
+</file>
+
+<file path=customXml/itemProps4.xml><?xml version="1.0" encoding="utf-8"?>
 <ds:datastoreItem xmlns:ds="http://schemas.openxmlformats.org/officeDocument/2006/customXml" ds:itemID="{B5105A87-47B6-44F6-97FD-4619C0556604}">
   <ds:schemaRefs>
     <ds:schemaRef ds:uri="http://schemas.microsoft.com/VisualStudio/2011/storyboarding/control"/>
@@ -36331,16 +36343,8 @@
 </ds:datastoreItem>
 </file>
 
-<file path=customXml/itemProps4.xml><?xml version="1.0" encoding="utf-8"?>
-<ds:datastoreItem xmlns:ds="http://schemas.openxmlformats.org/officeDocument/2006/customXml" ds:itemID="{8257D6BC-B71E-4D95-81E4-A1D4A8174168}">
-  <ds:schemaRefs>
-    <ds:schemaRef ds:uri="http://schemas.microsoft.com/VisualStudio/2011/storyboarding/control"/>
-  </ds:schemaRefs>
-</ds:datastoreItem>
-</file>
-
 <file path=customXml/itemProps5.xml><?xml version="1.0" encoding="utf-8"?>
-<ds:datastoreItem xmlns:ds="http://schemas.openxmlformats.org/officeDocument/2006/customXml" ds:itemID="{0B54C583-7BAB-4080-8093-C5F84F5A225A}">
+<ds:datastoreItem xmlns:ds="http://schemas.openxmlformats.org/officeDocument/2006/customXml" ds:itemID="{C0F92A87-A216-45A9-B9C0-0515663D35BF}">
   <ds:schemaRefs>
     <ds:schemaRef ds:uri="http://schemas.microsoft.com/VisualStudio/2011/storyboarding/control"/>
   </ds:schemaRefs>

</xml_diff>